<commit_message>
joting down ideas while editing
</commit_message>
<xml_diff>
--- a/IFD_figure_ideas.pptx
+++ b/IFD_figure_ideas.pptx
@@ -210,7 +210,7 @@
           <a:p>
             <a:fld id="{7E932C88-DB13-4CDC-93CF-3D59020D99F0}" type="datetimeFigureOut">
               <a:rPr lang="en-US" smtClean="0"/>
-              <a:t>4/14/2020</a:t>
+              <a:t>4/15/2020</a:t>
             </a:fld>
             <a:endParaRPr lang="en-US"/>
           </a:p>
@@ -944,7 +944,7 @@
           <a:p>
             <a:fld id="{53FBB08D-8B6E-4CC4-AAFF-DAD484D199D5}" type="datetimeFigureOut">
               <a:rPr lang="en-US" smtClean="0"/>
-              <a:t>4/14/2020</a:t>
+              <a:t>4/15/2020</a:t>
             </a:fld>
             <a:endParaRPr lang="en-US"/>
           </a:p>
@@ -1114,7 +1114,7 @@
           <a:p>
             <a:fld id="{53FBB08D-8B6E-4CC4-AAFF-DAD484D199D5}" type="datetimeFigureOut">
               <a:rPr lang="en-US" smtClean="0"/>
-              <a:t>4/14/2020</a:t>
+              <a:t>4/15/2020</a:t>
             </a:fld>
             <a:endParaRPr lang="en-US"/>
           </a:p>
@@ -1294,7 +1294,7 @@
           <a:p>
             <a:fld id="{53FBB08D-8B6E-4CC4-AAFF-DAD484D199D5}" type="datetimeFigureOut">
               <a:rPr lang="en-US" smtClean="0"/>
-              <a:t>4/14/2020</a:t>
+              <a:t>4/15/2020</a:t>
             </a:fld>
             <a:endParaRPr lang="en-US"/>
           </a:p>
@@ -1464,7 +1464,7 @@
           <a:p>
             <a:fld id="{53FBB08D-8B6E-4CC4-AAFF-DAD484D199D5}" type="datetimeFigureOut">
               <a:rPr lang="en-US" smtClean="0"/>
-              <a:t>4/14/2020</a:t>
+              <a:t>4/15/2020</a:t>
             </a:fld>
             <a:endParaRPr lang="en-US"/>
           </a:p>
@@ -1710,7 +1710,7 @@
           <a:p>
             <a:fld id="{53FBB08D-8B6E-4CC4-AAFF-DAD484D199D5}" type="datetimeFigureOut">
               <a:rPr lang="en-US" smtClean="0"/>
-              <a:t>4/14/2020</a:t>
+              <a:t>4/15/2020</a:t>
             </a:fld>
             <a:endParaRPr lang="en-US"/>
           </a:p>
@@ -1942,7 +1942,7 @@
           <a:p>
             <a:fld id="{53FBB08D-8B6E-4CC4-AAFF-DAD484D199D5}" type="datetimeFigureOut">
               <a:rPr lang="en-US" smtClean="0"/>
-              <a:t>4/14/2020</a:t>
+              <a:t>4/15/2020</a:t>
             </a:fld>
             <a:endParaRPr lang="en-US"/>
           </a:p>
@@ -2309,7 +2309,7 @@
           <a:p>
             <a:fld id="{53FBB08D-8B6E-4CC4-AAFF-DAD484D199D5}" type="datetimeFigureOut">
               <a:rPr lang="en-US" smtClean="0"/>
-              <a:t>4/14/2020</a:t>
+              <a:t>4/15/2020</a:t>
             </a:fld>
             <a:endParaRPr lang="en-US"/>
           </a:p>
@@ -2427,7 +2427,7 @@
           <a:p>
             <a:fld id="{53FBB08D-8B6E-4CC4-AAFF-DAD484D199D5}" type="datetimeFigureOut">
               <a:rPr lang="en-US" smtClean="0"/>
-              <a:t>4/14/2020</a:t>
+              <a:t>4/15/2020</a:t>
             </a:fld>
             <a:endParaRPr lang="en-US"/>
           </a:p>
@@ -2522,7 +2522,7 @@
           <a:p>
             <a:fld id="{53FBB08D-8B6E-4CC4-AAFF-DAD484D199D5}" type="datetimeFigureOut">
               <a:rPr lang="en-US" smtClean="0"/>
-              <a:t>4/14/2020</a:t>
+              <a:t>4/15/2020</a:t>
             </a:fld>
             <a:endParaRPr lang="en-US"/>
           </a:p>
@@ -2799,7 +2799,7 @@
           <a:p>
             <a:fld id="{53FBB08D-8B6E-4CC4-AAFF-DAD484D199D5}" type="datetimeFigureOut">
               <a:rPr lang="en-US" smtClean="0"/>
-              <a:t>4/14/2020</a:t>
+              <a:t>4/15/2020</a:t>
             </a:fld>
             <a:endParaRPr lang="en-US"/>
           </a:p>
@@ -3052,7 +3052,7 @@
           <a:p>
             <a:fld id="{53FBB08D-8B6E-4CC4-AAFF-DAD484D199D5}" type="datetimeFigureOut">
               <a:rPr lang="en-US" smtClean="0"/>
-              <a:t>4/14/2020</a:t>
+              <a:t>4/15/2020</a:t>
             </a:fld>
             <a:endParaRPr lang="en-US"/>
           </a:p>
@@ -3265,7 +3265,7 @@
           <a:p>
             <a:fld id="{53FBB08D-8B6E-4CC4-AAFF-DAD484D199D5}" type="datetimeFigureOut">
               <a:rPr lang="en-US" smtClean="0"/>
-              <a:t>4/14/2020</a:t>
+              <a:t>4/15/2020</a:t>
             </a:fld>
             <a:endParaRPr lang="en-US"/>
           </a:p>
@@ -3778,7 +3778,6 @@
               <a:rPr lang="en-US" sz="1400" dirty="0"/>
               <a:t>(6).</a:t>
             </a:r>
-            <a:endParaRPr lang="en-US" sz="1400" dirty="0"/>
           </a:p>
         </p:txBody>
       </p:sp>
@@ -5265,6 +5264,36 @@
           </a:p>
         </p:txBody>
       </p:sp>
+      <p:sp>
+        <p:nvSpPr>
+          <p:cNvPr id="2" name="TextBox 1"/>
+          <p:cNvSpPr txBox="1"/>
+          <p:nvPr/>
+        </p:nvSpPr>
+        <p:spPr>
+          <a:xfrm>
+            <a:off x="4602480" y="5813747"/>
+            <a:ext cx="5257800" cy="369332"/>
+          </a:xfrm>
+          <a:prstGeom prst="rect">
+            <a:avLst/>
+          </a:prstGeom>
+          <a:noFill/>
+        </p:spPr>
+        <p:txBody>
+          <a:bodyPr wrap="square" rtlCol="0">
+            <a:spAutoFit/>
+          </a:bodyPr>
+          <a:lstStyle/>
+          <a:p>
+            <a:r>
+              <a:rPr lang="en-US" dirty="0" smtClean="0"/>
+              <a:t>Add the IFD boxplots with these?!</a:t>
+            </a:r>
+            <a:endParaRPr lang="en-US" dirty="0"/>
+          </a:p>
+        </p:txBody>
+      </p:sp>
     </p:spTree>
     <p:extLst>
       <p:ext uri="{BB962C8B-B14F-4D97-AF65-F5344CB8AC3E}">

</xml_diff>